<commit_message>
esquema t1 y t2
</commit_message>
<xml_diff>
--- a/POSTER OPENSPARC.pptx
+++ b/POSTER OPENSPARC.pptx
@@ -204,7 +204,7 @@
           <a:p>
             <a:fld id="{F1C0B079-A316-4C9B-B165-DF9EA8325D2C}" type="datetimeFigureOut">
               <a:rPr lang="es-ES" smtClean="0"/>
-              <a:t>22/05/2016</a:t>
+              <a:t>24/05/2016</a:t>
             </a:fld>
             <a:endParaRPr lang="es-ES"/>
           </a:p>
@@ -368,7 +368,7 @@
           </a:lstStyle>
           <a:p>
             <a:fld id="{38F28AB8-57D1-494F-9851-055AD867E790}" type="datetimeFigureOut">
-              <a:t>22/05/2016</a:t>
+              <a:t>24/05/2016</a:t>
             </a:fld>
             <a:endParaRPr lang="es-ES"/>
           </a:p>
@@ -990,7 +990,7 @@
           <a:lstStyle/>
           <a:p>
             <a:fld id="{ECAA57DF-1C19-4726-AB84-014692BAD8F5}" type="datetimeFigureOut">
-              <a:t>22/05/2016</a:t>
+              <a:t>24/05/2016</a:t>
             </a:fld>
             <a:endParaRPr lang="es-ES"/>
           </a:p>
@@ -3258,7 +3258,7 @@
           <a:p>
             <a:fld id="{ECAA57DF-1C19-4726-AB84-014692BAD8F5}" type="datetimeFigureOut">
               <a:pPr/>
-              <a:t>22/05/2016</a:t>
+              <a:t>24/05/2016</a:t>
             </a:fld>
             <a:endParaRPr lang="es-ES"/>
           </a:p>
@@ -3828,6 +3828,7 @@
           </a:bodyPr>
           <a:lstStyle/>
           <a:p>
+            <a:pPr algn="just"/>
             <a:r>
               <a:rPr lang="es-CO" sz="3200" dirty="0" err="1"/>
               <a:t>OpenSPARC</a:t>
@@ -3846,6 +3847,7 @@
             </a:r>
           </a:p>
           <a:p>
+            <a:pPr algn="just"/>
             <a:r>
               <a:rPr lang="es-CO" sz="3200" dirty="0"/>
               <a:t>El procesador </a:t>
@@ -4173,6 +4175,7 @@
           </a:bodyPr>
           <a:lstStyle/>
           <a:p>
+            <a:pPr algn="just"/>
             <a:r>
               <a:rPr lang="es-CO" sz="3200" dirty="0" err="1"/>
               <a:t>OpenSPARC</a:t>
@@ -4223,6 +4226,7 @@
             </a:r>
           </a:p>
           <a:p>
+            <a:pPr algn="just"/>
             <a:r>
               <a:rPr lang="es-CO" sz="3200" dirty="0"/>
               <a:t>Fue un descubrimiento sin precedentes para reducir el consumo de energía del centro de datos, al tiempo que aumenta significativamente el flujo. Sus 32 hilos de procesamiento simultáneo, dibujo sobre tanta energía como una bombilla, dio a los clientes el mejor rendimiento por vatio de cualquier procesador disponible.</a:t>
@@ -4923,6 +4927,7 @@
             </a:lvl9pPr>
           </a:lstStyle>
           <a:p>
+            <a:pPr algn="just"/>
             <a:r>
               <a:rPr lang="es-CO" sz="3200" dirty="0" err="1"/>
               <a:t>OpenSPARC</a:t>
@@ -4957,6 +4962,7 @@
             </a:r>
           </a:p>
           <a:p>
+            <a:pPr algn="just"/>
             <a:r>
               <a:rPr lang="es-CO" sz="3200" dirty="0"/>
               <a:t>Al hacer que la fuente de este diseño disponible para una comunidad más grande de revisar y aprender de, esperamos que las ideas alrededor de chip </a:t>
@@ -5142,54 +5148,64 @@
           </a:p>
         </p:txBody>
       </p:sp>
-      <p:sp>
-        <p:nvSpPr>
-          <p:cNvPr id="21" name="Marcador de contenido 20"/>
-          <p:cNvSpPr>
-            <a:spLocks noGrp="1"/>
-          </p:cNvSpPr>
+      <p:pic>
+        <p:nvPicPr>
+          <p:cNvPr id="12" name="Marcador de contenido 11"/>
+          <p:cNvPicPr>
+            <a:picLocks noGrp="1" noChangeAspect="1"/>
+          </p:cNvPicPr>
           <p:nvPr>
             <p:ph sz="quarter" idx="32"/>
           </p:nvPr>
-        </p:nvSpPr>
+        </p:nvPicPr>
+        <p:blipFill>
+          <a:blip r:embed="rId10">
+            <a:extLst>
+              <a:ext uri="{28A0092B-C50C-407E-A947-70E740481C1C}">
+                <a14:useLocalDpi xmlns:a14="http://schemas.microsoft.com/office/drawing/2010/main" val="0"/>
+              </a:ext>
+            </a:extLst>
+          </a:blip>
+          <a:stretch>
+            <a:fillRect/>
+          </a:stretch>
+        </p:blipFill>
         <p:spPr>
           <a:xfrm>
-            <a:off x="11415066" y="15764361"/>
-            <a:ext cx="10076292" cy="6738241"/>
+            <a:off x="12192001" y="14251233"/>
+            <a:ext cx="8227310" cy="8251580"/>
           </a:xfrm>
         </p:spPr>
-        <p:txBody>
-          <a:bodyPr/>
-          <a:lstStyle/>
-          <a:p>
-            <a:endParaRPr lang="es-CO" dirty="0"/>
-          </a:p>
-        </p:txBody>
-      </p:sp>
-      <p:sp>
-        <p:nvSpPr>
-          <p:cNvPr id="22" name="Marcador de contenido 21"/>
-          <p:cNvSpPr>
-            <a:spLocks noGrp="1"/>
-          </p:cNvSpPr>
+      </p:pic>
+      <p:pic>
+        <p:nvPicPr>
+          <p:cNvPr id="17" name="Marcador de contenido 16"/>
+          <p:cNvPicPr>
+            <a:picLocks noGrp="1" noChangeAspect="1"/>
+          </p:cNvPicPr>
           <p:nvPr>
             <p:ph sz="quarter" idx="33"/>
           </p:nvPr>
-        </p:nvSpPr>
+        </p:nvPicPr>
+        <p:blipFill>
+          <a:blip r:embed="rId11">
+            <a:extLst>
+              <a:ext uri="{28A0092B-C50C-407E-A947-70E740481C1C}">
+                <a14:useLocalDpi xmlns:a14="http://schemas.microsoft.com/office/drawing/2010/main" val="0"/>
+              </a:ext>
+            </a:extLst>
+          </a:blip>
+          <a:stretch>
+            <a:fillRect/>
+          </a:stretch>
+        </p:blipFill>
         <p:spPr>
           <a:xfrm>
-            <a:off x="22310425" y="15765308"/>
-            <a:ext cx="10128440" cy="6738241"/>
+            <a:off x="23531512" y="15687676"/>
+            <a:ext cx="7939501" cy="6680200"/>
           </a:xfrm>
         </p:spPr>
-        <p:txBody>
-          <a:bodyPr/>
-          <a:lstStyle/>
-          <a:p>
-            <a:endParaRPr lang="es-CO" dirty="0"/>
-          </a:p>
-        </p:txBody>
-      </p:sp>
+      </p:pic>
       <p:sp>
         <p:nvSpPr>
           <p:cNvPr id="48" name="Marcador de texto 18"/>
@@ -5447,7 +5463,7 @@
           <a:p>
             <a:r>
               <a:rPr lang="es-ES" dirty="0">
-                <a:hlinkClick r:id="rId10"/>
+                <a:hlinkClick r:id="rId12"/>
               </a:rPr>
               <a:t>http://www.oracle.com/</a:t>
             </a:r>
@@ -5473,7 +5489,7 @@
           <p:nvPr/>
         </p:nvPicPr>
         <p:blipFill>
-          <a:blip r:embed="rId11">
+          <a:blip r:embed="rId13">
             <a:extLst>
               <a:ext uri="{28A0092B-C50C-407E-A947-70E740481C1C}">
                 <a14:useLocalDpi xmlns:a14="http://schemas.microsoft.com/office/drawing/2010/main" val="0"/>
@@ -5514,7 +5530,7 @@
           <p:nvPr/>
         </p:nvPicPr>
         <p:blipFill>
-          <a:blip r:embed="rId12">
+          <a:blip r:embed="rId14">
             <a:extLst>
               <a:ext uri="{28A0092B-C50C-407E-A947-70E740481C1C}">
                 <a14:useLocalDpi xmlns:a14="http://schemas.microsoft.com/office/drawing/2010/main" val="0"/>
@@ -6805,6 +6821,21 @@
 </file>
 
 <file path=customXml/item1.xml><?xml version="1.0" encoding="utf-8"?>
+<p:properties xmlns:p="http://schemas.microsoft.com/office/2006/metadata/properties" xmlns:xsi="http://www.w3.org/2001/XMLSchema-instance" xmlns:pc="http://schemas.microsoft.com/office/infopath/2007/PartnerControls">
+  <documentManagement/>
+</p:properties>
+</file>
+
+<file path=customXml/item2.xml><?xml version="1.0" encoding="utf-8"?>
+<?mso-contentType ?>
+<FormTemplates xmlns="http://schemas.microsoft.com/sharepoint/v3/contenttype/forms">
+  <Display>DocumentoBibliotecaFormulario</Display>
+  <Edit>DocumentoBibliotecaFormulario</Edit>
+  <New>DocumentoBibliotecaFormulario</New>
+</FormTemplates>
+</file>
+
+<file path=customXml/item3.xml><?xml version="1.0" encoding="utf-8"?>
 <ct:contentTypeSchema xmlns:ct="http://schemas.microsoft.com/office/2006/metadata/contentType" xmlns:ma="http://schemas.microsoft.com/office/2006/metadata/properties/metaAttributes" ct:_="" ma:_="" ma:contentTypeName="Document" ma:contentTypeID="0x0101007C1D5F340F01F94FA2FD29A5E6DC872E" ma:contentTypeVersion="0" ma:contentTypeDescription="Create a new document." ma:contentTypeScope="" ma:versionID="f583bd66513a361a730282b6a794e352">
   <xsd:schema xmlns:xsd="http://www.w3.org/2001/XMLSchema" xmlns:xs="http://www.w3.org/2001/XMLSchema" xmlns:p="http://schemas.microsoft.com/office/2006/metadata/properties" targetNamespace="http://schemas.microsoft.com/office/2006/metadata/properties" ma:root="true" ma:fieldsID="6841151cf538834e171094e4faaf2d73">
     <xsd:element name="properties">
@@ -6918,22 +6949,30 @@
 </ct:contentTypeSchema>
 </file>
 
-<file path=customXml/item2.xml><?xml version="1.0" encoding="utf-8"?>
-<?mso-contentType ?>
-<FormTemplates xmlns="http://schemas.microsoft.com/sharepoint/v3/contenttype/forms">
-  <Display>DocumentoBibliotecaFormulario</Display>
-  <Edit>DocumentoBibliotecaFormulario</Edit>
-  <New>DocumentoBibliotecaFormulario</New>
-</FormTemplates>
+<file path=customXml/itemProps1.xml><?xml version="1.0" encoding="utf-8"?>
+<ds:datastoreItem xmlns:ds="http://schemas.openxmlformats.org/officeDocument/2006/customXml" ds:itemID="{1E4AACF7-51B1-41A0-AAF9-D883E2E86D45}">
+  <ds:schemaRefs>
+    <ds:schemaRef ds:uri="http://schemas.microsoft.com/office/2006/metadata/properties"/>
+    <ds:schemaRef ds:uri="http://purl.org/dc/terms/"/>
+    <ds:schemaRef ds:uri="http://purl.org/dc/elements/1.1/"/>
+    <ds:schemaRef ds:uri="http://www.w3.org/XML/1998/namespace"/>
+    <ds:schemaRef ds:uri="http://schemas.microsoft.com/office/infopath/2007/PartnerControls"/>
+    <ds:schemaRef ds:uri="http://schemas.microsoft.com/office/2006/documentManagement/types"/>
+    <ds:schemaRef ds:uri="http://schemas.openxmlformats.org/package/2006/metadata/core-properties"/>
+    <ds:schemaRef ds:uri="http://purl.org/dc/dcmitype/"/>
+  </ds:schemaRefs>
+</ds:datastoreItem>
 </file>
 
-<file path=customXml/item3.xml><?xml version="1.0" encoding="utf-8"?>
-<p:properties xmlns:p="http://schemas.microsoft.com/office/2006/metadata/properties" xmlns:xsi="http://www.w3.org/2001/XMLSchema-instance" xmlns:pc="http://schemas.microsoft.com/office/infopath/2007/PartnerControls">
-  <documentManagement/>
-</p:properties>
+<file path=customXml/itemProps2.xml><?xml version="1.0" encoding="utf-8"?>
+<ds:datastoreItem xmlns:ds="http://schemas.openxmlformats.org/officeDocument/2006/customXml" ds:itemID="{CDCE3ED8-2D07-4BA2-9005-4F3ED3D7E6E9}">
+  <ds:schemaRefs>
+    <ds:schemaRef ds:uri="http://schemas.microsoft.com/sharepoint/v3/contenttype/forms"/>
+  </ds:schemaRefs>
+</ds:datastoreItem>
 </file>
 
-<file path=customXml/itemProps1.xml><?xml version="1.0" encoding="utf-8"?>
+<file path=customXml/itemProps3.xml><?xml version="1.0" encoding="utf-8"?>
 <ds:datastoreItem xmlns:ds="http://schemas.openxmlformats.org/officeDocument/2006/customXml" ds:itemID="{4D8B3D7D-95B4-4748-9FFB-C281E1B965A5}">
   <ds:schemaRefs>
     <ds:schemaRef ds:uri="http://schemas.microsoft.com/office/2006/metadata/contentType"/>
@@ -6947,27 +6986,4 @@
     <ds:schemaRef ds:uri="http://schemas.microsoft.com/office/infopath/2007/PartnerControls"/>
   </ds:schemaRefs>
 </ds:datastoreItem>
-</file>
-
-<file path=customXml/itemProps2.xml><?xml version="1.0" encoding="utf-8"?>
-<ds:datastoreItem xmlns:ds="http://schemas.openxmlformats.org/officeDocument/2006/customXml" ds:itemID="{CDCE3ED8-2D07-4BA2-9005-4F3ED3D7E6E9}">
-  <ds:schemaRefs>
-    <ds:schemaRef ds:uri="http://schemas.microsoft.com/sharepoint/v3/contenttype/forms"/>
-  </ds:schemaRefs>
-</ds:datastoreItem>
-</file>
-
-<file path=customXml/itemProps3.xml><?xml version="1.0" encoding="utf-8"?>
-<ds:datastoreItem xmlns:ds="http://schemas.openxmlformats.org/officeDocument/2006/customXml" ds:itemID="{1E4AACF7-51B1-41A0-AAF9-D883E2E86D45}">
-  <ds:schemaRefs>
-    <ds:schemaRef ds:uri="http://schemas.microsoft.com/office/2006/metadata/properties"/>
-    <ds:schemaRef ds:uri="http://purl.org/dc/terms/"/>
-    <ds:schemaRef ds:uri="http://purl.org/dc/elements/1.1/"/>
-    <ds:schemaRef ds:uri="http://www.w3.org/XML/1998/namespace"/>
-    <ds:schemaRef ds:uri="http://schemas.microsoft.com/office/infopath/2007/PartnerControls"/>
-    <ds:schemaRef ds:uri="http://schemas.microsoft.com/office/2006/documentManagement/types"/>
-    <ds:schemaRef ds:uri="http://schemas.openxmlformats.org/package/2006/metadata/core-properties"/>
-    <ds:schemaRef ds:uri="http://purl.org/dc/dcmitype/"/>
-  </ds:schemaRefs>
-</ds:datastoreItem>
 </file>
</xml_diff>